<commit_message>
scriptlet, shapes, spider chart, style, subreport
scriptlet, shapes, spider chart, stretch, style, subreport
</commit_message>
<xml_diff>
--- a/15_Ch19_API_q.pptx
+++ b/15_Ch19_API_q.pptx
@@ -3688,7 +3688,15 @@
                   <a:srgbClr val="FFFF00"/>
                 </a:solidFill>
               </a:rPr>
-              <a:t>19 JasperReports API: o</a:t>
+              <a:t>19 JasperReports API</a:t>
+            </a:r>
+            <a:r>
+              <a:rPr lang="en-US" altLang="zh-TW" b="1">
+                <a:solidFill>
+                  <a:srgbClr val="FFFF00"/>
+                </a:solidFill>
+              </a:rPr>
+              <a:t>: q</a:t>
             </a:r>
             <a:endParaRPr lang="zh-TW" altLang="en-US" b="1" dirty="0">
               <a:solidFill>

</xml_diff>